<commit_message>
included DRG code analysis, HR median D1 and dobutamine flag
</commit_message>
<xml_diff>
--- a/figure/dag.pptx
+++ b/figure/dag.pptx
@@ -290,7 +290,7 @@
           <a:p>
             <a:fld id="{9B4E7E55-DEF9-F146-9A51-7945C7879981}" type="datetimeFigureOut">
               <a:rPr lang="en-US" smtClean="0"/>
-              <a:t>10/24/14</a:t>
+              <a:t>11/26/14</a:t>
             </a:fld>
             <a:endParaRPr lang="en-US"/>
           </a:p>
@@ -460,7 +460,7 @@
           <a:p>
             <a:fld id="{9B4E7E55-DEF9-F146-9A51-7945C7879981}" type="datetimeFigureOut">
               <a:rPr lang="en-US" smtClean="0"/>
-              <a:t>10/24/14</a:t>
+              <a:t>11/26/14</a:t>
             </a:fld>
             <a:endParaRPr lang="en-US"/>
           </a:p>
@@ -640,7 +640,7 @@
           <a:p>
             <a:fld id="{9B4E7E55-DEF9-F146-9A51-7945C7879981}" type="datetimeFigureOut">
               <a:rPr lang="en-US" smtClean="0"/>
-              <a:t>10/24/14</a:t>
+              <a:t>11/26/14</a:t>
             </a:fld>
             <a:endParaRPr lang="en-US"/>
           </a:p>
@@ -810,7 +810,7 @@
           <a:p>
             <a:fld id="{9B4E7E55-DEF9-F146-9A51-7945C7879981}" type="datetimeFigureOut">
               <a:rPr lang="en-US" smtClean="0"/>
-              <a:t>10/24/14</a:t>
+              <a:t>11/26/14</a:t>
             </a:fld>
             <a:endParaRPr lang="en-US"/>
           </a:p>
@@ -1056,7 +1056,7 @@
           <a:p>
             <a:fld id="{9B4E7E55-DEF9-F146-9A51-7945C7879981}" type="datetimeFigureOut">
               <a:rPr lang="en-US" smtClean="0"/>
-              <a:t>10/24/14</a:t>
+              <a:t>11/26/14</a:t>
             </a:fld>
             <a:endParaRPr lang="en-US"/>
           </a:p>
@@ -1344,7 +1344,7 @@
           <a:p>
             <a:fld id="{9B4E7E55-DEF9-F146-9A51-7945C7879981}" type="datetimeFigureOut">
               <a:rPr lang="en-US" smtClean="0"/>
-              <a:t>10/24/14</a:t>
+              <a:t>11/26/14</a:t>
             </a:fld>
             <a:endParaRPr lang="en-US"/>
           </a:p>
@@ -1766,7 +1766,7 @@
           <a:p>
             <a:fld id="{9B4E7E55-DEF9-F146-9A51-7945C7879981}" type="datetimeFigureOut">
               <a:rPr lang="en-US" smtClean="0"/>
-              <a:t>10/24/14</a:t>
+              <a:t>11/26/14</a:t>
             </a:fld>
             <a:endParaRPr lang="en-US"/>
           </a:p>
@@ -1884,7 +1884,7 @@
           <a:p>
             <a:fld id="{9B4E7E55-DEF9-F146-9A51-7945C7879981}" type="datetimeFigureOut">
               <a:rPr lang="en-US" smtClean="0"/>
-              <a:t>10/24/14</a:t>
+              <a:t>11/26/14</a:t>
             </a:fld>
             <a:endParaRPr lang="en-US"/>
           </a:p>
@@ -1979,7 +1979,7 @@
           <a:p>
             <a:fld id="{9B4E7E55-DEF9-F146-9A51-7945C7879981}" type="datetimeFigureOut">
               <a:rPr lang="en-US" smtClean="0"/>
-              <a:t>10/24/14</a:t>
+              <a:t>11/26/14</a:t>
             </a:fld>
             <a:endParaRPr lang="en-US"/>
           </a:p>
@@ -2256,7 +2256,7 @@
           <a:p>
             <a:fld id="{9B4E7E55-DEF9-F146-9A51-7945C7879981}" type="datetimeFigureOut">
               <a:rPr lang="en-US" smtClean="0"/>
-              <a:t>10/24/14</a:t>
+              <a:t>11/26/14</a:t>
             </a:fld>
             <a:endParaRPr lang="en-US"/>
           </a:p>
@@ -2509,7 +2509,7 @@
           <a:p>
             <a:fld id="{9B4E7E55-DEF9-F146-9A51-7945C7879981}" type="datetimeFigureOut">
               <a:rPr lang="en-US" smtClean="0"/>
-              <a:t>10/24/14</a:t>
+              <a:t>11/26/14</a:t>
             </a:fld>
             <a:endParaRPr lang="en-US"/>
           </a:p>
@@ -2722,7 +2722,7 @@
           <a:p>
             <a:fld id="{9B4E7E55-DEF9-F146-9A51-7945C7879981}" type="datetimeFigureOut">
               <a:rPr lang="en-US" smtClean="0"/>
-              <a:t>10/24/14</a:t>
+              <a:t>11/26/14</a:t>
             </a:fld>
             <a:endParaRPr lang="en-US"/>
           </a:p>
@@ -6798,46 +6798,6 @@
           <a:xfrm>
             <a:off x="5416562" y="2807658"/>
             <a:ext cx="134689" cy="2850403"/>
-          </a:xfrm>
-          <a:prstGeom prst="straightConnector1">
-            <a:avLst/>
-          </a:prstGeom>
-          <a:ln>
-            <a:solidFill>
-              <a:schemeClr val="tx1"/>
-            </a:solidFill>
-            <a:tailEnd type="arrow"/>
-          </a:ln>
-          <a:effectLst/>
-        </p:spPr>
-        <p:style>
-          <a:lnRef idx="2">
-            <a:schemeClr val="accent1"/>
-          </a:lnRef>
-          <a:fillRef idx="0">
-            <a:schemeClr val="accent1"/>
-          </a:fillRef>
-          <a:effectRef idx="1">
-            <a:schemeClr val="accent1"/>
-          </a:effectRef>
-          <a:fontRef idx="minor">
-            <a:schemeClr val="tx1"/>
-          </a:fontRef>
-        </p:style>
-      </p:cxnSp>
-      <p:cxnSp>
-        <p:nvCxnSpPr>
-          <p:cNvPr id="131" name="Straight Arrow Connector 130"/>
-          <p:cNvCxnSpPr>
-            <a:stCxn id="9" idx="5"/>
-            <a:endCxn id="14" idx="2"/>
-          </p:cNvCxnSpPr>
-          <p:nvPr/>
-        </p:nvCxnSpPr>
-        <p:spPr>
-          <a:xfrm>
-            <a:off x="2348038" y="5392044"/>
-            <a:ext cx="2961352" cy="547139"/>
           </a:xfrm>
           <a:prstGeom prst="straightConnector1">
             <a:avLst/>

</xml_diff>